<commit_message>
Volume as a predictor and feature creation
- Added volume of options.
- Start with feature generation.
</commit_message>
<xml_diff>
--- a/Extra material/Sentiment-Volatility regression hypothesis testing.pptx
+++ b/Extra material/Sentiment-Volatility regression hypothesis testing.pptx
@@ -118,7 +118,7 @@
 <file path=ppt/revisionInfo.xml><?xml version="1.0" encoding="utf-8"?>
 <p1510:revInfo xmlns:a="http://schemas.openxmlformats.org/drawingml/2006/main" xmlns:r="http://schemas.openxmlformats.org/officeDocument/2006/relationships" xmlns:p1510="http://schemas.microsoft.com/office/powerpoint/2015/10/main">
   <p1510:revLst>
-    <p1510:client id="{2D21ECE3-BA3F-40D8-B783-BA1BBE3C0DE1}" v="343" dt="2022-05-15T12:38:58.429"/>
+    <p1510:client id="{2D21ECE3-BA3F-40D8-B783-BA1BBE3C0DE1}" v="344" dt="2022-05-15T20:09:58.051"/>
   </p1510:revLst>
 </p1510:revInfo>
 </file>
@@ -128,7 +128,7 @@
   <pc:docChgLst>
     <pc:chgData name="Antonis Mavritsakis" userId="1dc5bbb0-533b-41a8-9a3d-f10860421a24" providerId="ADAL" clId="{2D21ECE3-BA3F-40D8-B783-BA1BBE3C0DE1}"/>
     <pc:docChg chg="undo redo custSel delSld modSld sldOrd">
-      <pc:chgData name="Antonis Mavritsakis" userId="1dc5bbb0-533b-41a8-9a3d-f10860421a24" providerId="ADAL" clId="{2D21ECE3-BA3F-40D8-B783-BA1BBE3C0DE1}" dt="2022-05-15T16:09:09.175" v="2099" actId="5793"/>
+      <pc:chgData name="Antonis Mavritsakis" userId="1dc5bbb0-533b-41a8-9a3d-f10860421a24" providerId="ADAL" clId="{2D21ECE3-BA3F-40D8-B783-BA1BBE3C0DE1}" dt="2022-05-15T20:10:12.274" v="2112" actId="20577"/>
       <pc:docMkLst>
         <pc:docMk/>
       </pc:docMkLst>
@@ -156,13 +156,13 @@
         </pc:spChg>
       </pc:sldChg>
       <pc:sldChg chg="addSp modSp mod ord">
-        <pc:chgData name="Antonis Mavritsakis" userId="1dc5bbb0-533b-41a8-9a3d-f10860421a24" providerId="ADAL" clId="{2D21ECE3-BA3F-40D8-B783-BA1BBE3C0DE1}" dt="2022-05-15T12:42:01.016" v="1787"/>
+        <pc:chgData name="Antonis Mavritsakis" userId="1dc5bbb0-533b-41a8-9a3d-f10860421a24" providerId="ADAL" clId="{2D21ECE3-BA3F-40D8-B783-BA1BBE3C0DE1}" dt="2022-05-15T20:10:12.274" v="2112" actId="20577"/>
         <pc:sldMkLst>
           <pc:docMk/>
           <pc:sldMk cId="1385168048" sldId="257"/>
         </pc:sldMkLst>
         <pc:spChg chg="add mod">
-          <ac:chgData name="Antonis Mavritsakis" userId="1dc5bbb0-533b-41a8-9a3d-f10860421a24" providerId="ADAL" clId="{2D21ECE3-BA3F-40D8-B783-BA1BBE3C0DE1}" dt="2022-05-15T12:35:18.522" v="1402" actId="14100"/>
+          <ac:chgData name="Antonis Mavritsakis" userId="1dc5bbb0-533b-41a8-9a3d-f10860421a24" providerId="ADAL" clId="{2D21ECE3-BA3F-40D8-B783-BA1BBE3C0DE1}" dt="2022-05-15T20:10:12.274" v="2112" actId="20577"/>
           <ac:spMkLst>
             <pc:docMk/>
             <pc:sldMk cId="1385168048" sldId="257"/>
@@ -3732,8 +3732,8 @@
           <a:chExt cx="0" cy="0"/>
         </a:xfrm>
       </p:grpSpPr>
-      <mc:AlternateContent xmlns:mc="http://schemas.openxmlformats.org/markup-compatibility/2006" xmlns:a14="http://schemas.microsoft.com/office/drawing/2010/main">
-        <mc:Choice Requires="a14">
+      <mc:AlternateContent xmlns:mc="http://schemas.openxmlformats.org/markup-compatibility/2006">
+        <mc:Choice xmlns:a14="http://schemas.microsoft.com/office/drawing/2010/main" Requires="a14">
           <p:sp>
             <p:nvSpPr>
               <p:cNvPr id="2" name="TextBox 1">
@@ -4412,7 +4412,7 @@
                       <a:rPr lang="en-US" b="0" i="1" smtClean="0">
                         <a:latin typeface="Cambria Math" panose="02040503050406030204" pitchFamily="18" charset="0"/>
                       </a:rPr>
-                      <m:t>: </m:t>
+                      <m:t>:</m:t>
                     </m:r>
                     <m:nary>
                       <m:naryPr>
@@ -4505,13 +4505,20 @@
                 </a:pPr>
                 <a:r>
                   <a:rPr lang="en-US" dirty="0"/>
-                  <a:t>Accumulated error must be regulated.</a:t>
+                  <a:t>Accumulated error must be regulated </a:t>
                 </a:r>
+                <a:r>
+                  <a:rPr lang="en-US" dirty="0">
+                    <a:sym typeface="Wingdings" panose="05000000000000000000" pitchFamily="2" charset="2"/>
+                  </a:rPr>
+                  <a:t> ANOVA</a:t>
+                </a:r>
+                <a:endParaRPr lang="en-US" dirty="0"/>
               </a:p>
             </p:txBody>
           </p:sp>
         </mc:Choice>
-        <mc:Fallback xmlns="">
+        <mc:Fallback>
           <p:sp>
             <p:nvSpPr>
               <p:cNvPr id="2" name="TextBox 1">

</xml_diff>